<commit_message>
piquenas modansas a aprecentacao
</commit_message>
<xml_diff>
--- a/Apresentação_Professoras.pptx
+++ b/Apresentação_Professoras.pptx
@@ -216,7 +216,7 @@
             <a:fld id="{37A1BFF5-21BF-4160-B9BB-AE71C1FED557}" type="datetime1">
               <a:rPr lang="pt-PT" smtClean="0"/>
               <a:pPr algn="r" rtl="0"/>
-              <a:t>11/05/2015</a:t>
+              <a:t>13/05/2015</a:t>
             </a:fld>
             <a:endParaRPr lang="pt-PT" dirty="0"/>
           </a:p>
@@ -386,7 +386,7 @@
             <a:fld id="{9976EA48-158B-44E6-AD53-699CA8A0F7E6}" type="datetime1">
               <a:rPr lang="pt-PT" smtClean="0"/>
               <a:pPr/>
-              <a:t>11/05/2015</a:t>
+              <a:t>13/05/2015</a:t>
             </a:fld>
             <a:endParaRPr lang="pt-PT" dirty="0"/>
           </a:p>
@@ -1084,7 +1084,7 @@
             <a:pPr rtl="0"/>
             <a:fld id="{0EDF9E83-E3DA-408D-85CA-63B9C848490F}" type="datetime1">
               <a:rPr lang="pt-PT" smtClean="0"/>
-              <a:t>11/05/2015</a:t>
+              <a:t>13/05/2015</a:t>
             </a:fld>
             <a:endParaRPr lang="pt-PT" dirty="0"/>
           </a:p>
@@ -1568,7 +1568,7 @@
           <a:p>
             <a:fld id="{C672435D-889D-4605-9B71-5777366C97E9}" type="datetime1">
               <a:rPr lang="pt-PT" smtClean="0"/>
-              <a:t>11/05/2015</a:t>
+              <a:t>13/05/2015</a:t>
             </a:fld>
             <a:endParaRPr lang="pt-PT" dirty="0"/>
           </a:p>
@@ -1917,7 +1917,7 @@
             <a:pPr rtl="0"/>
             <a:fld id="{3719EFB4-D578-406C-B5FC-CFD3FC5115D2}" type="datetime1">
               <a:rPr lang="pt-PT" smtClean="0"/>
-              <a:t>11/05/2015</a:t>
+              <a:t>13/05/2015</a:t>
             </a:fld>
             <a:endParaRPr lang="pt-PT" dirty="0"/>
           </a:p>
@@ -2364,7 +2364,7 @@
             <a:pPr rtl="0"/>
             <a:fld id="{571B7CA9-9EE8-4EC4-B7E4-C13E6C098698}" type="datetime1">
               <a:rPr lang="pt-PT" smtClean="0"/>
-              <a:t>11/05/2015</a:t>
+              <a:t>13/05/2015</a:t>
             </a:fld>
             <a:endParaRPr lang="pt-PT" dirty="0"/>
           </a:p>
@@ -2554,7 +2554,7 @@
             <a:pPr rtl="0"/>
             <a:fld id="{A11C99E7-A041-4443-B313-69BCA096C13B}" type="datetime1">
               <a:rPr lang="pt-PT" smtClean="0"/>
-              <a:t>11/05/2015</a:t>
+              <a:t>13/05/2015</a:t>
             </a:fld>
             <a:endParaRPr lang="pt-PT" dirty="0"/>
           </a:p>
@@ -2721,7 +2721,7 @@
             <a:pPr rtl="0"/>
             <a:fld id="{D5BD57B6-C8DC-4166-B848-025F6D9B2932}" type="datetime1">
               <a:rPr lang="pt-PT" smtClean="0"/>
-              <a:t>11/05/2015</a:t>
+              <a:t>13/05/2015</a:t>
             </a:fld>
             <a:endParaRPr lang="pt-PT" dirty="0"/>
           </a:p>
@@ -3097,7 +3097,7 @@
             <a:pPr rtl="0"/>
             <a:fld id="{D494D41D-98D1-4117-9216-898FF0A2C660}" type="datetime1">
               <a:rPr lang="pt-PT" smtClean="0"/>
-              <a:t>11/05/2015</a:t>
+              <a:t>13/05/2015</a:t>
             </a:fld>
             <a:endParaRPr lang="pt-PT" dirty="0"/>
           </a:p>
@@ -3417,7 +3417,7 @@
             <a:pPr rtl="0"/>
             <a:fld id="{A58BA3B0-D199-4628-8808-9D9747AE17FA}" type="datetime1">
               <a:rPr lang="pt-PT" smtClean="0"/>
-              <a:t>11/05/2015</a:t>
+              <a:t>13/05/2015</a:t>
             </a:fld>
             <a:endParaRPr lang="pt-PT" dirty="0"/>
           </a:p>
@@ -3797,7 +3797,7 @@
             <a:pPr rtl="0"/>
             <a:fld id="{F4DA9748-5395-4C78-8590-DF83EC36AA61}" type="datetime1">
               <a:rPr lang="pt-PT" smtClean="0"/>
-              <a:t>11/05/2015</a:t>
+              <a:t>13/05/2015</a:t>
             </a:fld>
             <a:endParaRPr lang="pt-PT" dirty="0"/>
           </a:p>
@@ -4398,51 +4398,7 @@
             <a:pPr algn="just"/>
             <a:r>
               <a:rPr lang="pt-PT" dirty="0" smtClean="0"/>
-              <a:t>Este sistema </a:t>
-            </a:r>
-            <a:r>
-              <a:rPr lang="pt-PT" dirty="0" smtClean="0"/>
-              <a:t>permite</a:t>
-            </a:r>
-            <a:r>
-              <a:rPr lang="pt-PT" dirty="0" smtClean="0"/>
-              <a:t> </a:t>
-            </a:r>
-            <a:r>
-              <a:rPr lang="pt-PT" dirty="0" smtClean="0"/>
-              <a:t>aos </a:t>
-            </a:r>
-            <a:r>
-              <a:rPr lang="pt-PT" dirty="0" smtClean="0"/>
-              <a:t>alunos e docentes </a:t>
-            </a:r>
-            <a:r>
-              <a:rPr lang="pt-PT" dirty="0" smtClean="0"/>
-              <a:t>comunicar entre </a:t>
-            </a:r>
-            <a:r>
-              <a:rPr lang="pt-PT" dirty="0" smtClean="0"/>
-              <a:t>si</a:t>
-            </a:r>
-            <a:r>
-              <a:rPr lang="pt-PT" dirty="0" smtClean="0"/>
-              <a:t> </a:t>
-            </a:r>
-            <a:r>
-              <a:rPr lang="pt-PT" dirty="0" smtClean="0"/>
-              <a:t>durante o desenvolvimento </a:t>
-            </a:r>
-            <a:r>
-              <a:rPr lang="pt-PT" dirty="0" smtClean="0"/>
-              <a:t>do</a:t>
-            </a:r>
-            <a:r>
-              <a:rPr lang="pt-PT" dirty="0" smtClean="0"/>
-              <a:t> </a:t>
-            </a:r>
-            <a:r>
-              <a:rPr lang="pt-PT" dirty="0" smtClean="0"/>
-              <a:t>projeto, dentro ou fora de aula.</a:t>
+              <a:t>Este sistema permite aos alunos e docentes comunicar entre si durante o desenvolvimento do projeto, dentro ou fora de aula.</a:t>
             </a:r>
             <a:endParaRPr lang="en-GB" dirty="0"/>
           </a:p>
@@ -4787,11 +4743,7 @@
             <a:pPr algn="ctr"/>
             <a:r>
               <a:rPr lang="pt-PT" dirty="0" smtClean="0"/>
-              <a:t>Proposta de logótipo</a:t>
-            </a:r>
-            <a:r>
-              <a:rPr lang="pt-PT" dirty="0" smtClean="0"/>
-              <a:t>.</a:t>
+              <a:t>Proposta de logótipo.</a:t>
             </a:r>
             <a:endParaRPr lang="en-GB" dirty="0"/>
           </a:p>
@@ -4964,51 +4916,7 @@
             <a:pPr algn="just"/>
             <a:r>
               <a:rPr lang="pt-PT" dirty="0" smtClean="0"/>
-              <a:t>A autentificação </a:t>
-            </a:r>
-            <a:r>
-              <a:rPr lang="pt-PT" dirty="0" smtClean="0"/>
-              <a:t>será</a:t>
-            </a:r>
-            <a:r>
-              <a:rPr lang="pt-PT" dirty="0" smtClean="0"/>
-              <a:t> </a:t>
-            </a:r>
-            <a:r>
-              <a:rPr lang="pt-PT" dirty="0" smtClean="0"/>
-              <a:t>feita </a:t>
-            </a:r>
-            <a:r>
-              <a:rPr lang="pt-PT" dirty="0" smtClean="0"/>
-              <a:t>através de</a:t>
-            </a:r>
-            <a:r>
-              <a:rPr lang="pt-PT" dirty="0" smtClean="0"/>
-              <a:t> </a:t>
-            </a:r>
-            <a:r>
-              <a:rPr lang="pt-PT" dirty="0" smtClean="0"/>
-              <a:t>um sistema de login, </a:t>
-            </a:r>
-            <a:r>
-              <a:rPr lang="pt-PT" dirty="0" smtClean="0"/>
-              <a:t>onde será solicitado aos</a:t>
-            </a:r>
-            <a:r>
-              <a:rPr lang="pt-PT" dirty="0" smtClean="0"/>
-              <a:t> </a:t>
-            </a:r>
-            <a:r>
-              <a:rPr lang="pt-PT" dirty="0" smtClean="0"/>
-              <a:t>alunos e docentes </a:t>
-            </a:r>
-            <a:r>
-              <a:rPr lang="pt-PT" dirty="0" smtClean="0"/>
-              <a:t>a inserção de um</a:t>
-            </a:r>
-            <a:r>
-              <a:rPr lang="pt-PT" dirty="0" smtClean="0"/>
-              <a:t> </a:t>
+              <a:t>A autentificação será feita através de um sistema de login, onde será solicitado aos alunos e docentes a inserção de um </a:t>
             </a:r>
             <a:r>
               <a:rPr lang="pt-PT" b="1" dirty="0" smtClean="0"/>
@@ -5016,11 +4924,7 @@
             </a:r>
             <a:r>
               <a:rPr lang="pt-PT" dirty="0" smtClean="0"/>
-              <a:t> e </a:t>
-            </a:r>
-            <a:r>
-              <a:rPr lang="pt-PT" dirty="0" smtClean="0"/>
-              <a:t>uma </a:t>
+              <a:t> e uma </a:t>
             </a:r>
             <a:r>
               <a:rPr lang="pt-PT" b="1" dirty="0" smtClean="0"/>
@@ -5198,7 +5102,6 @@
               <a:rPr lang="pt-PT" dirty="0" smtClean="0"/>
               <a:t>Poema </a:t>
             </a:r>
-            <a:endParaRPr lang="pt-PT" dirty="0" smtClean="0"/>
           </a:p>
           <a:p>
             <a:pPr marL="285750" indent="-285750">
@@ -5209,7 +5112,6 @@
               <a:rPr lang="pt-PT" dirty="0" smtClean="0"/>
               <a:t>Jornal </a:t>
             </a:r>
-            <a:endParaRPr lang="pt-PT" dirty="0" smtClean="0"/>
           </a:p>
           <a:p>
             <a:pPr marL="285750" indent="-285750">
@@ -5220,7 +5122,6 @@
               <a:rPr lang="pt-PT" dirty="0" smtClean="0"/>
               <a:t>Desenho </a:t>
             </a:r>
-            <a:endParaRPr lang="pt-PT" dirty="0" smtClean="0"/>
           </a:p>
           <a:p>
             <a:endParaRPr lang="pt-PT" dirty="0" smtClean="0"/>
@@ -5301,6 +5202,47 @@
           </a:p>
         </p:txBody>
       </p:sp>
+      <p:pic>
+        <p:nvPicPr>
+          <p:cNvPr id="1026" name="Picture 2" descr="http://localhost:8080/img/Poema.png"/>
+          <p:cNvPicPr>
+            <a:picLocks noChangeAspect="1" noChangeArrowheads="1"/>
+          </p:cNvPicPr>
+          <p:nvPr/>
+        </p:nvPicPr>
+        <p:blipFill>
+          <a:blip r:embed="rId4" cstate="print">
+            <a:extLst>
+              <a:ext uri="{28A0092B-C50C-407E-A947-70E740481C1C}">
+                <a14:useLocalDpi xmlns:a14="http://schemas.microsoft.com/office/drawing/2010/main" val="0"/>
+              </a:ext>
+            </a:extLst>
+          </a:blip>
+          <a:srcRect/>
+          <a:stretch>
+            <a:fillRect/>
+          </a:stretch>
+        </p:blipFill>
+        <p:spPr bwMode="auto">
+          <a:xfrm>
+            <a:off x="3669740" y="4333072"/>
+            <a:ext cx="691587" cy="691587"/>
+          </a:xfrm>
+          <a:prstGeom prst="rect">
+            <a:avLst/>
+          </a:prstGeom>
+          <a:noFill/>
+          <a:extLst>
+            <a:ext uri="{909E8E84-426E-40DD-AFC4-6F175D3DCCD1}">
+              <a14:hiddenFill xmlns:a14="http://schemas.microsoft.com/office/drawing/2010/main">
+                <a:solidFill>
+                  <a:srgbClr val="FFFFFF"/>
+                </a:solidFill>
+              </a14:hiddenFill>
+            </a:ext>
+          </a:extLst>
+        </p:spPr>
+      </p:pic>
     </p:spTree>
     <p:extLst>
       <p:ext uri="{BB962C8B-B14F-4D97-AF65-F5344CB8AC3E}">
@@ -5367,11 +5309,7 @@
           <a:p>
             <a:r>
               <a:rPr lang="pt-PT" dirty="0" smtClean="0"/>
-              <a:t>Tipos de </a:t>
-            </a:r>
-            <a:r>
-              <a:rPr lang="pt-PT" dirty="0" smtClean="0"/>
-              <a:t>páginas</a:t>
+              <a:t>Tipos de páginas</a:t>
             </a:r>
             <a:endParaRPr lang="en-GB" dirty="0"/>
           </a:p>
@@ -5498,15 +5436,7 @@
           <a:p>
             <a:r>
               <a:rPr lang="pt-PT" b="1" dirty="0" smtClean="0"/>
-              <a:t>Cada projeto pode usar todos tipos de </a:t>
-            </a:r>
-            <a:r>
-              <a:rPr lang="pt-PT" b="1" dirty="0" smtClean="0"/>
-              <a:t>páginas</a:t>
-            </a:r>
-            <a:r>
-              <a:rPr lang="pt-PT" b="1" dirty="0" smtClean="0"/>
-              <a:t>.</a:t>
+              <a:t>Cada projeto pode usar todos tipos de páginas.</a:t>
             </a:r>
             <a:endParaRPr lang="en-GB" b="1" dirty="0"/>
           </a:p>
@@ -6960,12 +6890,6 @@
 </file>
 
 <file path=customXml/item2.xml><?xml version="1.0" encoding="utf-8"?>
-<p:properties xmlns:p="http://schemas.microsoft.com/office/2006/metadata/properties" xmlns:xsi="http://www.w3.org/2001/XMLSchema-instance" xmlns:pc="http://schemas.microsoft.com/office/infopath/2007/PartnerControls">
-  <documentManagement/>
-</p:properties>
-</file>
-
-<file path=customXml/item3.xml><?xml version="1.0" encoding="utf-8"?>
 <ct:contentTypeSchema xmlns:ct="http://schemas.microsoft.com/office/2006/metadata/contentType" xmlns:ma="http://schemas.microsoft.com/office/2006/metadata/properties/metaAttributes" ct:_="" ma:_="" ma:contentTypeName="Document" ma:contentTypeID="0x0101007C1D5F340F01F94FA2FD29A5E6DC872E" ma:contentTypeVersion="0" ma:contentTypeDescription="Create a new document." ma:contentTypeScope="" ma:versionID="141aba3b8f8cb7f331be6546df69db50">
   <xsd:schema xmlns:xsd="http://www.w3.org/2001/XMLSchema" xmlns:xs="http://www.w3.org/2001/XMLSchema" xmlns:p="http://schemas.microsoft.com/office/2006/metadata/properties" targetNamespace="http://schemas.microsoft.com/office/2006/metadata/properties" ma:root="true" ma:fieldsID="f8e4ef66d87525153bd8907774ed28f8">
     <xsd:element name="properties">
@@ -7079,6 +7003,12 @@
 </ct:contentTypeSchema>
 </file>
 
+<file path=customXml/item3.xml><?xml version="1.0" encoding="utf-8"?>
+<p:properties xmlns:p="http://schemas.microsoft.com/office/2006/metadata/properties" xmlns:xsi="http://www.w3.org/2001/XMLSchema-instance" xmlns:pc="http://schemas.microsoft.com/office/infopath/2007/PartnerControls">
+  <documentManagement/>
+</p:properties>
+</file>
+
 <file path=customXml/itemProps1.xml><?xml version="1.0" encoding="utf-8"?>
 <ds:datastoreItem xmlns:ds="http://schemas.openxmlformats.org/officeDocument/2006/customXml" ds:itemID="{9F7A874A-6E55-415B-9061-8B2D43DC2F48}">
   <ds:schemaRefs>
@@ -7088,21 +7018,6 @@
 </file>
 
 <file path=customXml/itemProps2.xml><?xml version="1.0" encoding="utf-8"?>
-<ds:datastoreItem xmlns:ds="http://schemas.openxmlformats.org/officeDocument/2006/customXml" ds:itemID="{91BC99BC-3A63-4255-9D4F-38C5B80A3193}">
-  <ds:schemaRefs>
-    <ds:schemaRef ds:uri="http://schemas.microsoft.com/office/2006/documentManagement/types"/>
-    <ds:schemaRef ds:uri="http://purl.org/dc/terms/"/>
-    <ds:schemaRef ds:uri="http://schemas.openxmlformats.org/package/2006/metadata/core-properties"/>
-    <ds:schemaRef ds:uri="http://purl.org/dc/dcmitype/"/>
-    <ds:schemaRef ds:uri="http://schemas.microsoft.com/office/infopath/2007/PartnerControls"/>
-    <ds:schemaRef ds:uri="http://purl.org/dc/elements/1.1/"/>
-    <ds:schemaRef ds:uri="http://schemas.microsoft.com/office/2006/metadata/properties"/>
-    <ds:schemaRef ds:uri="http://www.w3.org/XML/1998/namespace"/>
-  </ds:schemaRefs>
-</ds:datastoreItem>
-</file>
-
-<file path=customXml/itemProps3.xml><?xml version="1.0" encoding="utf-8"?>
 <ds:datastoreItem xmlns:ds="http://schemas.openxmlformats.org/officeDocument/2006/customXml" ds:itemID="{9896FEF9-821E-45A6-82F2-0B1CE4CD8CF4}">
   <ds:schemaRefs>
     <ds:schemaRef ds:uri="http://schemas.microsoft.com/office/2006/metadata/contentType"/>
@@ -7116,4 +7031,19 @@
     <ds:schemaRef ds:uri="http://schemas.microsoft.com/office/infopath/2007/PartnerControls"/>
   </ds:schemaRefs>
 </ds:datastoreItem>
+</file>
+
+<file path=customXml/itemProps3.xml><?xml version="1.0" encoding="utf-8"?>
+<ds:datastoreItem xmlns:ds="http://schemas.openxmlformats.org/officeDocument/2006/customXml" ds:itemID="{91BC99BC-3A63-4255-9D4F-38C5B80A3193}">
+  <ds:schemaRefs>
+    <ds:schemaRef ds:uri="http://schemas.microsoft.com/office/2006/documentManagement/types"/>
+    <ds:schemaRef ds:uri="http://purl.org/dc/terms/"/>
+    <ds:schemaRef ds:uri="http://schemas.openxmlformats.org/package/2006/metadata/core-properties"/>
+    <ds:schemaRef ds:uri="http://purl.org/dc/dcmitype/"/>
+    <ds:schemaRef ds:uri="http://schemas.microsoft.com/office/infopath/2007/PartnerControls"/>
+    <ds:schemaRef ds:uri="http://purl.org/dc/elements/1.1/"/>
+    <ds:schemaRef ds:uri="http://schemas.microsoft.com/office/2006/metadata/properties"/>
+    <ds:schemaRef ds:uri="http://www.w3.org/XML/1998/namespace"/>
+  </ds:schemaRefs>
+</ds:datastoreItem>
 </file>
</xml_diff>